<commit_message>
WIP: @dmitchell412 need quadrature/entropy writeup
</commit_message>
<xml_diff>
--- a/pdffig/figures.pptx
+++ b/pdffig/figures.pptx
@@ -6,6 +6,7 @@
   </p:sldMasterIdLst>
   <p:sldIdLst>
     <p:sldId id="256" r:id="rId2"/>
+    <p:sldId id="257" r:id="rId3"/>
   </p:sldIdLst>
   <p:sldSz cx="9144000" cy="6858000" type="screen4x3"/>
   <p:notesSz cx="6858000" cy="9144000"/>
@@ -288,7 +289,7 @@
           <a:p>
             <a:fld id="{8F450D6D-46A5-D540-88BB-4C1218A83310}" type="datetimeFigureOut">
               <a:rPr lang="en-US" smtClean="0"/>
-              <a:t>5/18/16</a:t>
+              <a:t>5/19/16</a:t>
             </a:fld>
             <a:endParaRPr lang="en-US"/>
           </a:p>
@@ -458,7 +459,7 @@
           <a:p>
             <a:fld id="{8F450D6D-46A5-D540-88BB-4C1218A83310}" type="datetimeFigureOut">
               <a:rPr lang="en-US" smtClean="0"/>
-              <a:t>5/18/16</a:t>
+              <a:t>5/19/16</a:t>
             </a:fld>
             <a:endParaRPr lang="en-US"/>
           </a:p>
@@ -638,7 +639,7 @@
           <a:p>
             <a:fld id="{8F450D6D-46A5-D540-88BB-4C1218A83310}" type="datetimeFigureOut">
               <a:rPr lang="en-US" smtClean="0"/>
-              <a:t>5/18/16</a:t>
+              <a:t>5/19/16</a:t>
             </a:fld>
             <a:endParaRPr lang="en-US"/>
           </a:p>
@@ -808,7 +809,7 @@
           <a:p>
             <a:fld id="{8F450D6D-46A5-D540-88BB-4C1218A83310}" type="datetimeFigureOut">
               <a:rPr lang="en-US" smtClean="0"/>
-              <a:t>5/18/16</a:t>
+              <a:t>5/19/16</a:t>
             </a:fld>
             <a:endParaRPr lang="en-US"/>
           </a:p>
@@ -1054,7 +1055,7 @@
           <a:p>
             <a:fld id="{8F450D6D-46A5-D540-88BB-4C1218A83310}" type="datetimeFigureOut">
               <a:rPr lang="en-US" smtClean="0"/>
-              <a:t>5/18/16</a:t>
+              <a:t>5/19/16</a:t>
             </a:fld>
             <a:endParaRPr lang="en-US"/>
           </a:p>
@@ -1342,7 +1343,7 @@
           <a:p>
             <a:fld id="{8F450D6D-46A5-D540-88BB-4C1218A83310}" type="datetimeFigureOut">
               <a:rPr lang="en-US" smtClean="0"/>
-              <a:t>5/18/16</a:t>
+              <a:t>5/19/16</a:t>
             </a:fld>
             <a:endParaRPr lang="en-US"/>
           </a:p>
@@ -1764,7 +1765,7 @@
           <a:p>
             <a:fld id="{8F450D6D-46A5-D540-88BB-4C1218A83310}" type="datetimeFigureOut">
               <a:rPr lang="en-US" smtClean="0"/>
-              <a:t>5/18/16</a:t>
+              <a:t>5/19/16</a:t>
             </a:fld>
             <a:endParaRPr lang="en-US"/>
           </a:p>
@@ -1882,7 +1883,7 @@
           <a:p>
             <a:fld id="{8F450D6D-46A5-D540-88BB-4C1218A83310}" type="datetimeFigureOut">
               <a:rPr lang="en-US" smtClean="0"/>
-              <a:t>5/18/16</a:t>
+              <a:t>5/19/16</a:t>
             </a:fld>
             <a:endParaRPr lang="en-US"/>
           </a:p>
@@ -1977,7 +1978,7 @@
           <a:p>
             <a:fld id="{8F450D6D-46A5-D540-88BB-4C1218A83310}" type="datetimeFigureOut">
               <a:rPr lang="en-US" smtClean="0"/>
-              <a:t>5/18/16</a:t>
+              <a:t>5/19/16</a:t>
             </a:fld>
             <a:endParaRPr lang="en-US"/>
           </a:p>
@@ -2254,7 +2255,7 @@
           <a:p>
             <a:fld id="{8F450D6D-46A5-D540-88BB-4C1218A83310}" type="datetimeFigureOut">
               <a:rPr lang="en-US" smtClean="0"/>
-              <a:t>5/18/16</a:t>
+              <a:t>5/19/16</a:t>
             </a:fld>
             <a:endParaRPr lang="en-US"/>
           </a:p>
@@ -2507,7 +2508,7 @@
           <a:p>
             <a:fld id="{8F450D6D-46A5-D540-88BB-4C1218A83310}" type="datetimeFigureOut">
               <a:rPr lang="en-US" smtClean="0"/>
-              <a:t>5/18/16</a:t>
+              <a:t>5/19/16</a:t>
             </a:fld>
             <a:endParaRPr lang="en-US"/>
           </a:p>
@@ -2720,7 +2721,7 @@
           <a:p>
             <a:fld id="{8F450D6D-46A5-D540-88BB-4C1218A83310}" type="datetimeFigureOut">
               <a:rPr lang="en-US" smtClean="0"/>
-              <a:t>5/18/16</a:t>
+              <a:t>5/19/16</a:t>
             </a:fld>
             <a:endParaRPr lang="en-US"/>
           </a:p>
@@ -3097,6 +3098,35 @@
       </p:grpSpPr>
       <p:pic>
         <p:nvPicPr>
+          <p:cNvPr id="38" name="Picture 37" descr="5013564.png"/>
+          <p:cNvPicPr>
+            <a:picLocks noChangeAspect="1"/>
+          </p:cNvPicPr>
+          <p:nvPr/>
+        </p:nvPicPr>
+        <p:blipFill rotWithShape="1">
+          <a:blip r:embed="rId2">
+            <a:extLst>
+              <a:ext uri="{28A0092B-C50C-407E-A947-70E740481C1C}">
+                <a14:useLocalDpi xmlns:a14="http://schemas.microsoft.com/office/drawing/2010/main" val="0"/>
+              </a:ext>
+            </a:extLst>
+          </a:blip>
+          <a:srcRect l="48663" b="61536"/>
+          <a:stretch/>
+        </p:blipFill>
+        <p:spPr>
+          <a:xfrm>
+            <a:off x="11181488" y="-944864"/>
+            <a:ext cx="3090389" cy="1533848"/>
+          </a:xfrm>
+          <a:prstGeom prst="rect">
+            <a:avLst/>
+          </a:prstGeom>
+        </p:spPr>
+      </p:pic>
+      <p:pic>
+        <p:nvPicPr>
           <p:cNvPr id="4" name="Picture 3"/>
           <p:cNvPicPr>
             <a:picLocks noChangeAspect="1"/>
@@ -3104,7 +3134,7 @@
           <p:nvPr/>
         </p:nvPicPr>
         <p:blipFill>
-          <a:blip r:embed="rId2"/>
+          <a:blip r:embed="rId3"/>
           <a:stretch>
             <a:fillRect/>
           </a:stretch>
@@ -3192,7 +3222,7 @@
         <p:spPr>
           <a:xfrm>
             <a:off x="2348829" y="4826182"/>
-            <a:ext cx="0" cy="343374"/>
+            <a:ext cx="0" cy="901518"/>
           </a:xfrm>
           <a:prstGeom prst="line">
             <a:avLst/>
@@ -3409,8 +3439,8 @@
         </p:nvSpPr>
         <p:spPr>
           <a:xfrm>
-            <a:off x="4325169" y="4672293"/>
-            <a:ext cx="4844458" cy="307777"/>
+            <a:off x="2595089" y="4672293"/>
+            <a:ext cx="5891356" cy="307777"/>
           </a:xfrm>
           <a:prstGeom prst="rect">
             <a:avLst/>
@@ -3425,11 +3455,11 @@
           <a:p>
             <a:r>
               <a:rPr lang="en-US" sz="1400" dirty="0" smtClean="0"/>
-              <a:t>Echo Time = </a:t>
+              <a:t>Echo Time = TE1 = effective TE = Time readout crosses k-space </a:t>
             </a:r>
             <a:r>
               <a:rPr lang="en-US" sz="1400" dirty="0" smtClean="0"/>
-              <a:t>TE1 = effective TE = Time readout crosses k-space 0</a:t>
+              <a:t>0 on first image</a:t>
             </a:r>
             <a:endParaRPr lang="en-US" sz="1400" dirty="0"/>
           </a:p>
@@ -3443,7 +3473,7 @@
         </p:nvSpPr>
         <p:spPr>
           <a:xfrm>
-            <a:off x="3749715" y="5197631"/>
+            <a:off x="945194" y="652188"/>
             <a:ext cx="1701783" cy="307777"/>
           </a:xfrm>
           <a:prstGeom prst="rect">
@@ -3465,40 +3495,6 @@
           </a:p>
         </p:txBody>
       </p:sp>
-      <p:cxnSp>
-        <p:nvCxnSpPr>
-          <p:cNvPr id="22" name="Straight Arrow Connector 21"/>
-          <p:cNvCxnSpPr/>
-          <p:nvPr/>
-        </p:nvCxnSpPr>
-        <p:spPr>
-          <a:xfrm>
-            <a:off x="627080" y="5505408"/>
-            <a:ext cx="8260443" cy="0"/>
-          </a:xfrm>
-          <a:prstGeom prst="straightConnector1">
-            <a:avLst/>
-          </a:prstGeom>
-          <a:ln>
-            <a:headEnd type="arrow"/>
-            <a:tailEnd type="arrow"/>
-          </a:ln>
-        </p:spPr>
-        <p:style>
-          <a:lnRef idx="2">
-            <a:schemeClr val="accent1"/>
-          </a:lnRef>
-          <a:fillRef idx="0">
-            <a:schemeClr val="accent1"/>
-          </a:fillRef>
-          <a:effectRef idx="1">
-            <a:schemeClr val="accent1"/>
-          </a:effectRef>
-          <a:fontRef idx="minor">
-            <a:schemeClr val="tx1"/>
-          </a:fontRef>
-        </p:style>
-      </p:cxnSp>
       <p:cxnSp>
         <p:nvCxnSpPr>
           <p:cNvPr id="23" name="Straight Connector 22"/>
@@ -3507,7 +3503,7 @@
         </p:nvCxnSpPr>
         <p:spPr>
           <a:xfrm>
-            <a:off x="627080" y="5290311"/>
+            <a:off x="675740" y="474358"/>
             <a:ext cx="0" cy="343374"/>
           </a:xfrm>
           <a:prstGeom prst="line">
@@ -3537,7 +3533,7 @@
         </p:nvCxnSpPr>
         <p:spPr>
           <a:xfrm>
-            <a:off x="8887523" y="5290311"/>
+            <a:off x="13848849" y="462703"/>
             <a:ext cx="0" cy="343374"/>
           </a:xfrm>
           <a:prstGeom prst="line">
@@ -3900,7 +3896,7 @@
           <p:nvPr/>
         </p:nvPicPr>
         <p:blipFill rotWithShape="1">
-          <a:blip r:embed="rId3">
+          <a:blip r:embed="rId2">
             <a:extLst>
               <a:ext uri="{28A0092B-C50C-407E-A947-70E740481C1C}">
                 <a14:useLocalDpi xmlns:a14="http://schemas.microsoft.com/office/drawing/2010/main" val="0"/>
@@ -3929,7 +3925,7 @@
           <p:nvPr/>
         </p:nvPicPr>
         <p:blipFill rotWithShape="1">
-          <a:blip r:embed="rId2"/>
+          <a:blip r:embed="rId3"/>
           <a:srcRect l="56249" r="18751" b="9419"/>
           <a:stretch/>
         </p:blipFill>
@@ -3982,7 +3978,7 @@
           <p:nvPr/>
         </p:nvPicPr>
         <p:blipFill rotWithShape="1">
-          <a:blip r:embed="rId2"/>
+          <a:blip r:embed="rId3"/>
           <a:srcRect l="56249" r="18751" b="9419"/>
           <a:stretch/>
         </p:blipFill>
@@ -4005,7 +4001,7 @@
           <p:nvPr/>
         </p:nvPicPr>
         <p:blipFill rotWithShape="1">
-          <a:blip r:embed="rId2"/>
+          <a:blip r:embed="rId3"/>
           <a:srcRect l="81388" r="-6388" b="9417"/>
           <a:stretch/>
         </p:blipFill>
@@ -4019,35 +4015,6 @@
           </a:prstGeom>
         </p:spPr>
       </p:pic>
-      <p:pic>
-        <p:nvPicPr>
-          <p:cNvPr id="38" name="Picture 37" descr="5013564.png"/>
-          <p:cNvPicPr>
-            <a:picLocks noChangeAspect="1"/>
-          </p:cNvPicPr>
-          <p:nvPr/>
-        </p:nvPicPr>
-        <p:blipFill rotWithShape="1">
-          <a:blip r:embed="rId3">
-            <a:extLst>
-              <a:ext uri="{28A0092B-C50C-407E-A947-70E740481C1C}">
-                <a14:useLocalDpi xmlns:a14="http://schemas.microsoft.com/office/drawing/2010/main" val="0"/>
-              </a:ext>
-            </a:extLst>
-          </a:blip>
-          <a:srcRect l="48663" b="61536"/>
-          <a:stretch/>
-        </p:blipFill>
-        <p:spPr>
-          <a:xfrm>
-            <a:off x="11181488" y="-1097264"/>
-            <a:ext cx="3090389" cy="1533848"/>
-          </a:xfrm>
-          <a:prstGeom prst="rect">
-            <a:avLst/>
-          </a:prstGeom>
-        </p:spPr>
-      </p:pic>
       <p:sp>
         <p:nvSpPr>
           <p:cNvPr id="39" name="TextBox 38"/>
@@ -4056,7 +4023,7 @@
         </p:nvSpPr>
         <p:spPr>
           <a:xfrm>
-            <a:off x="6976729" y="4000792"/>
+            <a:off x="7027529" y="3949992"/>
             <a:ext cx="671979" cy="307777"/>
           </a:xfrm>
           <a:prstGeom prst="rect">
@@ -4088,8 +4055,8 @@
         </p:nvSpPr>
         <p:spPr>
           <a:xfrm>
-            <a:off x="9387836" y="3889503"/>
-            <a:ext cx="671979" cy="523220"/>
+            <a:off x="9387836" y="3953003"/>
+            <a:ext cx="671979" cy="307777"/>
           </a:xfrm>
           <a:prstGeom prst="rect">
             <a:avLst/>
@@ -4106,11 +4073,13 @@
           <a:p>
             <a:r>
               <a:rPr lang="en-US" sz="1400" dirty="0" smtClean="0"/>
-              <a:t>Echo 3</a:t>
-            </a:r>
-          </a:p>
-          <a:p>
-            <a:endParaRPr lang="en-US" sz="1400" dirty="0"/>
+              <a:t>Echo </a:t>
+            </a:r>
+            <a:r>
+              <a:rPr lang="en-US" sz="1400" dirty="0" smtClean="0"/>
+              <a:t>3</a:t>
+            </a:r>
+            <a:endParaRPr lang="en-US" sz="1400" dirty="0" smtClean="0"/>
           </a:p>
         </p:txBody>
       </p:sp>
@@ -4122,8 +4091,8 @@
         </p:nvSpPr>
         <p:spPr>
           <a:xfrm>
-            <a:off x="13192047" y="3990232"/>
-            <a:ext cx="671979" cy="523220"/>
+            <a:off x="13344447" y="3990232"/>
+            <a:ext cx="671979" cy="307777"/>
           </a:xfrm>
           <a:prstGeom prst="rect">
             <a:avLst/>
@@ -4139,13 +4108,354 @@
           <a:lstStyle/>
           <a:p>
             <a:r>
-              <a:rPr lang="en-US" sz="1400" smtClean="0"/>
-              <a:t>Echo 8</a:t>
+              <a:rPr lang="en-US" sz="1400" dirty="0" smtClean="0"/>
+              <a:t>Echo </a:t>
+            </a:r>
+            <a:r>
+              <a:rPr lang="en-US" sz="1400" dirty="0" smtClean="0"/>
+              <a:t>8</a:t>
             </a:r>
             <a:endParaRPr lang="en-US" sz="1400" dirty="0" smtClean="0"/>
           </a:p>
-          <a:p>
+        </p:txBody>
+      </p:sp>
+      <p:sp>
+        <p:nvSpPr>
+          <p:cNvPr id="42" name="TextBox 41"/>
+          <p:cNvSpPr txBox="1"/>
+          <p:nvPr/>
+        </p:nvSpPr>
+        <p:spPr>
+          <a:xfrm>
+            <a:off x="2646977" y="5267886"/>
+            <a:ext cx="6122189" cy="307777"/>
+          </a:xfrm>
+          <a:prstGeom prst="rect">
+            <a:avLst/>
+          </a:prstGeom>
+          <a:noFill/>
+        </p:spPr>
+        <p:txBody>
+          <a:bodyPr wrap="none" rtlCol="0">
+            <a:spAutoFit/>
+          </a:bodyPr>
+          <a:lstStyle/>
+          <a:p>
+            <a:r>
+              <a:rPr lang="en-US" sz="1400" dirty="0" smtClean="0"/>
+              <a:t>Echo Time = </a:t>
+            </a:r>
+            <a:r>
+              <a:rPr lang="en-US" sz="1400" dirty="0" smtClean="0"/>
+              <a:t>TE2 </a:t>
+            </a:r>
+            <a:r>
+              <a:rPr lang="en-US" sz="1400" dirty="0" smtClean="0"/>
+              <a:t>= effective TE = Time readout crosses k-space </a:t>
+            </a:r>
+            <a:r>
+              <a:rPr lang="en-US" sz="1400" dirty="0" smtClean="0"/>
+              <a:t>0 on second image</a:t>
+            </a:r>
             <a:endParaRPr lang="en-US" sz="1400" dirty="0"/>
+          </a:p>
+        </p:txBody>
+      </p:sp>
+      <p:cxnSp>
+        <p:nvCxnSpPr>
+          <p:cNvPr id="43" name="Straight Arrow Connector 42"/>
+          <p:cNvCxnSpPr/>
+          <p:nvPr/>
+        </p:nvCxnSpPr>
+        <p:spPr>
+          <a:xfrm flipV="1">
+            <a:off x="2348829" y="5575663"/>
+            <a:ext cx="11375497" cy="24907"/>
+          </a:xfrm>
+          <a:prstGeom prst="straightConnector1">
+            <a:avLst/>
+          </a:prstGeom>
+          <a:ln>
+            <a:headEnd type="arrow"/>
+            <a:tailEnd type="arrow"/>
+          </a:ln>
+        </p:spPr>
+        <p:style>
+          <a:lnRef idx="2">
+            <a:schemeClr val="accent1"/>
+          </a:lnRef>
+          <a:fillRef idx="0">
+            <a:schemeClr val="accent1"/>
+          </a:fillRef>
+          <a:effectRef idx="1">
+            <a:schemeClr val="accent1"/>
+          </a:effectRef>
+          <a:fontRef idx="minor">
+            <a:schemeClr val="tx1"/>
+          </a:fontRef>
+        </p:style>
+      </p:cxnSp>
+      <p:cxnSp>
+        <p:nvCxnSpPr>
+          <p:cNvPr id="44" name="Straight Connector 43"/>
+          <p:cNvCxnSpPr/>
+          <p:nvPr/>
+        </p:nvCxnSpPr>
+        <p:spPr>
+          <a:xfrm>
+            <a:off x="13724326" y="5378213"/>
+            <a:ext cx="0" cy="343374"/>
+          </a:xfrm>
+          <a:prstGeom prst="line">
+            <a:avLst/>
+          </a:prstGeom>
+        </p:spPr>
+        <p:style>
+          <a:lnRef idx="2">
+            <a:schemeClr val="accent1"/>
+          </a:lnRef>
+          <a:fillRef idx="0">
+            <a:schemeClr val="accent1"/>
+          </a:fillRef>
+          <a:effectRef idx="1">
+            <a:schemeClr val="accent1"/>
+          </a:effectRef>
+          <a:fontRef idx="minor">
+            <a:schemeClr val="tx1"/>
+          </a:fontRef>
+        </p:style>
+      </p:cxnSp>
+      <p:cxnSp>
+        <p:nvCxnSpPr>
+          <p:cNvPr id="22" name="Straight Arrow Connector 21"/>
+          <p:cNvCxnSpPr/>
+          <p:nvPr/>
+        </p:nvCxnSpPr>
+        <p:spPr>
+          <a:xfrm flipV="1">
+            <a:off x="670960" y="588984"/>
+            <a:ext cx="13193066" cy="6308"/>
+          </a:xfrm>
+          <a:prstGeom prst="straightConnector1">
+            <a:avLst/>
+          </a:prstGeom>
+          <a:ln>
+            <a:headEnd type="arrow"/>
+            <a:tailEnd type="arrow"/>
+          </a:ln>
+        </p:spPr>
+        <p:style>
+          <a:lnRef idx="2">
+            <a:schemeClr val="accent1"/>
+          </a:lnRef>
+          <a:fillRef idx="0">
+            <a:schemeClr val="accent1"/>
+          </a:fillRef>
+          <a:effectRef idx="1">
+            <a:schemeClr val="accent1"/>
+          </a:effectRef>
+          <a:fontRef idx="minor">
+            <a:schemeClr val="tx1"/>
+          </a:fontRef>
+        </p:style>
+      </p:cxnSp>
+      <p:sp>
+        <p:nvSpPr>
+          <p:cNvPr id="45" name="TextBox 44"/>
+          <p:cNvSpPr txBox="1"/>
+          <p:nvPr/>
+        </p:nvSpPr>
+        <p:spPr>
+          <a:xfrm>
+            <a:off x="10678561" y="3886492"/>
+            <a:ext cx="1056239" cy="307777"/>
+          </a:xfrm>
+          <a:prstGeom prst="rect">
+            <a:avLst/>
+          </a:prstGeom>
+          <a:solidFill>
+            <a:schemeClr val="bg1"/>
+          </a:solidFill>
+        </p:spPr>
+        <p:txBody>
+          <a:bodyPr wrap="square" rtlCol="0">
+            <a:spAutoFit/>
+          </a:bodyPr>
+          <a:lstStyle/>
+          <a:p>
+            <a:r>
+              <a:rPr lang="en-US" sz="1400" dirty="0" smtClean="0"/>
+              <a:t>Echo </a:t>
+            </a:r>
+            <a:r>
+              <a:rPr lang="en-US" sz="1400" dirty="0" smtClean="0"/>
+              <a:t>4-7</a:t>
+            </a:r>
+            <a:endParaRPr lang="en-US" sz="1400" dirty="0" smtClean="0"/>
+          </a:p>
+        </p:txBody>
+      </p:sp>
+      <p:sp>
+        <p:nvSpPr>
+          <p:cNvPr id="46" name="Oval 45"/>
+          <p:cNvSpPr/>
+          <p:nvPr/>
+        </p:nvSpPr>
+        <p:spPr>
+          <a:xfrm>
+            <a:off x="9382450" y="698602"/>
+            <a:ext cx="677365" cy="522726"/>
+          </a:xfrm>
+          <a:prstGeom prst="ellipse">
+            <a:avLst/>
+          </a:prstGeom>
+          <a:noFill/>
+          <a:ln>
+            <a:solidFill>
+              <a:srgbClr val="FFFF00"/>
+            </a:solidFill>
+            <a:prstDash val="sysDash"/>
+          </a:ln>
+        </p:spPr>
+        <p:style>
+          <a:lnRef idx="1">
+            <a:schemeClr val="accent1"/>
+          </a:lnRef>
+          <a:fillRef idx="3">
+            <a:schemeClr val="accent1"/>
+          </a:fillRef>
+          <a:effectRef idx="2">
+            <a:schemeClr val="accent1"/>
+          </a:effectRef>
+          <a:fontRef idx="minor">
+            <a:schemeClr val="lt1"/>
+          </a:fontRef>
+        </p:style>
+        <p:txBody>
+          <a:bodyPr rtlCol="0" anchor="ctr"/>
+          <a:lstStyle/>
+          <a:p>
+            <a:pPr algn="ctr"/>
+            <a:endParaRPr lang="en-US"/>
+          </a:p>
+        </p:txBody>
+      </p:sp>
+      <p:cxnSp>
+        <p:nvCxnSpPr>
+          <p:cNvPr id="47" name="Straight Connector 46"/>
+          <p:cNvCxnSpPr/>
+          <p:nvPr/>
+        </p:nvCxnSpPr>
+        <p:spPr>
+          <a:xfrm>
+            <a:off x="9723826" y="-103122"/>
+            <a:ext cx="0" cy="755310"/>
+          </a:xfrm>
+          <a:prstGeom prst="line">
+            <a:avLst/>
+          </a:prstGeom>
+          <a:ln w="6350">
+            <a:solidFill>
+              <a:srgbClr val="FFFF00"/>
+            </a:solidFill>
+            <a:prstDash val="dash"/>
+            <a:headEnd type="triangle"/>
+          </a:ln>
+        </p:spPr>
+        <p:style>
+          <a:lnRef idx="2">
+            <a:schemeClr val="accent1"/>
+          </a:lnRef>
+          <a:fillRef idx="0">
+            <a:schemeClr val="accent1"/>
+          </a:fillRef>
+          <a:effectRef idx="1">
+            <a:schemeClr val="accent1"/>
+          </a:effectRef>
+          <a:fontRef idx="minor">
+            <a:schemeClr val="tx1"/>
+          </a:fontRef>
+        </p:style>
+      </p:cxnSp>
+      <p:cxnSp>
+        <p:nvCxnSpPr>
+          <p:cNvPr id="48" name="Straight Connector 47"/>
+          <p:cNvCxnSpPr/>
+          <p:nvPr/>
+        </p:nvCxnSpPr>
+        <p:spPr>
+          <a:xfrm>
+            <a:off x="13584626" y="-103122"/>
+            <a:ext cx="0" cy="755310"/>
+          </a:xfrm>
+          <a:prstGeom prst="line">
+            <a:avLst/>
+          </a:prstGeom>
+          <a:ln w="6350">
+            <a:solidFill>
+              <a:srgbClr val="FFFF00"/>
+            </a:solidFill>
+            <a:prstDash val="dash"/>
+            <a:headEnd type="triangle"/>
+          </a:ln>
+        </p:spPr>
+        <p:style>
+          <a:lnRef idx="2">
+            <a:schemeClr val="accent1"/>
+          </a:lnRef>
+          <a:fillRef idx="0">
+            <a:schemeClr val="accent1"/>
+          </a:fillRef>
+          <a:effectRef idx="1">
+            <a:schemeClr val="accent1"/>
+          </a:effectRef>
+          <a:fontRef idx="minor">
+            <a:schemeClr val="tx1"/>
+          </a:fontRef>
+        </p:style>
+      </p:cxnSp>
+      <p:sp>
+        <p:nvSpPr>
+          <p:cNvPr id="49" name="Oval 48"/>
+          <p:cNvSpPr/>
+          <p:nvPr/>
+        </p:nvSpPr>
+        <p:spPr>
+          <a:xfrm>
+            <a:off x="13295062" y="715502"/>
+            <a:ext cx="677365" cy="522726"/>
+          </a:xfrm>
+          <a:prstGeom prst="ellipse">
+            <a:avLst/>
+          </a:prstGeom>
+          <a:noFill/>
+          <a:ln>
+            <a:solidFill>
+              <a:srgbClr val="FFFF00"/>
+            </a:solidFill>
+            <a:prstDash val="sysDash"/>
+          </a:ln>
+        </p:spPr>
+        <p:style>
+          <a:lnRef idx="1">
+            <a:schemeClr val="accent1"/>
+          </a:lnRef>
+          <a:fillRef idx="3">
+            <a:schemeClr val="accent1"/>
+          </a:fillRef>
+          <a:effectRef idx="2">
+            <a:schemeClr val="accent1"/>
+          </a:effectRef>
+          <a:fontRef idx="minor">
+            <a:schemeClr val="lt1"/>
+          </a:fontRef>
+        </p:style>
+        <p:txBody>
+          <a:bodyPr rtlCol="0" anchor="ctr"/>
+          <a:lstStyle/>
+          <a:p>
+            <a:pPr algn="ctr"/>
+            <a:endParaRPr lang="en-US"/>
           </a:p>
         </p:txBody>
       </p:sp>
@@ -4153,6 +4463,1360 @@
     <p:extLst>
       <p:ext uri="{BB962C8B-B14F-4D97-AF65-F5344CB8AC3E}">
         <p14:creationId xmlns:p14="http://schemas.microsoft.com/office/powerpoint/2010/main" val="4115037442"/>
+      </p:ext>
+    </p:extLst>
+  </p:cSld>
+  <p:clrMapOvr>
+    <a:masterClrMapping/>
+  </p:clrMapOvr>
+</p:sld>
+</file>
+
+<file path=ppt/slides/slide2.xml><?xml version="1.0" encoding="utf-8"?>
+<p:sld xmlns:a="http://schemas.openxmlformats.org/drawingml/2006/main" xmlns:r="http://schemas.openxmlformats.org/officeDocument/2006/relationships" xmlns:p="http://schemas.openxmlformats.org/presentationml/2006/main">
+  <p:cSld>
+    <p:spTree>
+      <p:nvGrpSpPr>
+        <p:cNvPr id="1" name=""/>
+        <p:cNvGrpSpPr/>
+        <p:nvPr/>
+      </p:nvGrpSpPr>
+      <p:grpSpPr>
+        <a:xfrm>
+          <a:off x="0" y="0"/>
+          <a:ext cx="0" cy="0"/>
+          <a:chOff x="0" y="0"/>
+          <a:chExt cx="0" cy="0"/>
+        </a:xfrm>
+      </p:grpSpPr>
+      <p:pic>
+        <p:nvPicPr>
+          <p:cNvPr id="4" name="Picture 3"/>
+          <p:cNvPicPr>
+            <a:picLocks noChangeAspect="1"/>
+          </p:cNvPicPr>
+          <p:nvPr/>
+        </p:nvPicPr>
+        <p:blipFill>
+          <a:blip r:embed="rId2"/>
+          <a:stretch>
+            <a:fillRect/>
+          </a:stretch>
+        </p:blipFill>
+        <p:spPr>
+          <a:xfrm>
+            <a:off x="1765300" y="1676400"/>
+            <a:ext cx="5511800" cy="4394200"/>
+          </a:xfrm>
+          <a:prstGeom prst="rect">
+            <a:avLst/>
+          </a:prstGeom>
+        </p:spPr>
+      </p:pic>
+      <p:cxnSp>
+        <p:nvCxnSpPr>
+          <p:cNvPr id="6" name="Straight Arrow Connector 5"/>
+          <p:cNvCxnSpPr/>
+          <p:nvPr/>
+        </p:nvCxnSpPr>
+        <p:spPr>
+          <a:xfrm flipH="1" flipV="1">
+            <a:off x="1511300" y="1676400"/>
+            <a:ext cx="12700" cy="4673600"/>
+          </a:xfrm>
+          <a:prstGeom prst="straightConnector1">
+            <a:avLst/>
+          </a:prstGeom>
+          <a:ln>
+            <a:tailEnd type="arrow"/>
+          </a:ln>
+        </p:spPr>
+        <p:style>
+          <a:lnRef idx="2">
+            <a:schemeClr val="accent1"/>
+          </a:lnRef>
+          <a:fillRef idx="0">
+            <a:schemeClr val="accent1"/>
+          </a:fillRef>
+          <a:effectRef idx="1">
+            <a:schemeClr val="accent1"/>
+          </a:effectRef>
+          <a:fontRef idx="minor">
+            <a:schemeClr val="tx1"/>
+          </a:fontRef>
+        </p:style>
+      </p:cxnSp>
+      <p:cxnSp>
+        <p:nvCxnSpPr>
+          <p:cNvPr id="8" name="Straight Arrow Connector 7"/>
+          <p:cNvCxnSpPr/>
+          <p:nvPr/>
+        </p:nvCxnSpPr>
+        <p:spPr>
+          <a:xfrm rot="5400000" flipV="1">
+            <a:off x="3746500" y="3987801"/>
+            <a:ext cx="12700" cy="4673600"/>
+          </a:xfrm>
+          <a:prstGeom prst="straightConnector1">
+            <a:avLst/>
+          </a:prstGeom>
+          <a:ln>
+            <a:tailEnd type="arrow"/>
+          </a:ln>
+        </p:spPr>
+        <p:style>
+          <a:lnRef idx="2">
+            <a:schemeClr val="accent1"/>
+          </a:lnRef>
+          <a:fillRef idx="0">
+            <a:schemeClr val="accent1"/>
+          </a:fillRef>
+          <a:effectRef idx="1">
+            <a:schemeClr val="accent1"/>
+          </a:effectRef>
+          <a:fontRef idx="minor">
+            <a:schemeClr val="tx1"/>
+          </a:fontRef>
+        </p:style>
+      </p:cxnSp>
+      <p:sp>
+        <p:nvSpPr>
+          <p:cNvPr id="9" name="TextBox 8"/>
+          <p:cNvSpPr txBox="1"/>
+          <p:nvPr/>
+        </p:nvSpPr>
+        <p:spPr>
+          <a:xfrm>
+            <a:off x="1008038" y="2084311"/>
+            <a:ext cx="382612" cy="307777"/>
+          </a:xfrm>
+          <a:prstGeom prst="rect">
+            <a:avLst/>
+          </a:prstGeom>
+          <a:noFill/>
+        </p:spPr>
+        <p:txBody>
+          <a:bodyPr wrap="none" rtlCol="0">
+            <a:spAutoFit/>
+          </a:bodyPr>
+          <a:lstStyle/>
+          <a:p>
+            <a:r>
+              <a:rPr lang="en-US" sz="1400" dirty="0" smtClean="0"/>
+              <a:t>TD</a:t>
+            </a:r>
+            <a:endParaRPr lang="en-US" sz="1400" dirty="0"/>
+          </a:p>
+        </p:txBody>
+      </p:sp>
+      <p:sp>
+        <p:nvSpPr>
+          <p:cNvPr id="10" name="TextBox 9"/>
+          <p:cNvSpPr txBox="1"/>
+          <p:nvPr/>
+        </p:nvSpPr>
+        <p:spPr>
+          <a:xfrm>
+            <a:off x="5453038" y="6440411"/>
+            <a:ext cx="359819" cy="307777"/>
+          </a:xfrm>
+          <a:prstGeom prst="rect">
+            <a:avLst/>
+          </a:prstGeom>
+          <a:noFill/>
+        </p:spPr>
+        <p:txBody>
+          <a:bodyPr wrap="none" rtlCol="0">
+            <a:spAutoFit/>
+          </a:bodyPr>
+          <a:lstStyle/>
+          <a:p>
+            <a:r>
+              <a:rPr lang="en-US" sz="1400" dirty="0" smtClean="0"/>
+              <a:t>TE</a:t>
+            </a:r>
+            <a:endParaRPr lang="en-US" sz="1400" dirty="0"/>
+          </a:p>
+        </p:txBody>
+      </p:sp>
+      <p:grpSp>
+        <p:nvGrpSpPr>
+          <p:cNvPr id="21" name="Group 20"/>
+          <p:cNvGrpSpPr/>
+          <p:nvPr/>
+        </p:nvGrpSpPr>
+        <p:grpSpPr>
+          <a:xfrm>
+            <a:off x="2019300" y="3009900"/>
+            <a:ext cx="622300" cy="1855711"/>
+            <a:chOff x="2476500" y="952500"/>
+            <a:chExt cx="622300" cy="1855711"/>
+          </a:xfrm>
+        </p:grpSpPr>
+        <p:sp>
+          <p:nvSpPr>
+            <p:cNvPr id="11" name="Rectangle 10"/>
+            <p:cNvSpPr/>
+            <p:nvPr/>
+          </p:nvSpPr>
+          <p:spPr>
+            <a:xfrm>
+              <a:off x="2476500" y="952500"/>
+              <a:ext cx="165100" cy="190500"/>
+            </a:xfrm>
+            <a:prstGeom prst="rect">
+              <a:avLst/>
+            </a:prstGeom>
+            <a:solidFill>
+              <a:srgbClr val="FFFF00"/>
+            </a:solidFill>
+            <a:ln>
+              <a:solidFill>
+                <a:srgbClr val="FFFF00"/>
+              </a:solidFill>
+            </a:ln>
+          </p:spPr>
+          <p:style>
+            <a:lnRef idx="1">
+              <a:schemeClr val="accent1"/>
+            </a:lnRef>
+            <a:fillRef idx="3">
+              <a:schemeClr val="accent1"/>
+            </a:fillRef>
+            <a:effectRef idx="2">
+              <a:schemeClr val="accent1"/>
+            </a:effectRef>
+            <a:fontRef idx="minor">
+              <a:schemeClr val="lt1"/>
+            </a:fontRef>
+          </p:style>
+          <p:txBody>
+            <a:bodyPr rtlCol="0" anchor="ctr"/>
+            <a:lstStyle/>
+            <a:p>
+              <a:pPr algn="ctr"/>
+              <a:endParaRPr lang="en-US"/>
+            </a:p>
+          </p:txBody>
+        </p:sp>
+        <p:sp>
+          <p:nvSpPr>
+            <p:cNvPr id="12" name="Rectangle 11"/>
+            <p:cNvSpPr/>
+            <p:nvPr/>
+          </p:nvSpPr>
+          <p:spPr>
+            <a:xfrm>
+              <a:off x="2933700" y="952500"/>
+              <a:ext cx="165100" cy="190500"/>
+            </a:xfrm>
+            <a:prstGeom prst="rect">
+              <a:avLst/>
+            </a:prstGeom>
+            <a:solidFill>
+              <a:srgbClr val="FFFF00"/>
+            </a:solidFill>
+            <a:ln>
+              <a:solidFill>
+                <a:srgbClr val="FFFF00"/>
+              </a:solidFill>
+            </a:ln>
+          </p:spPr>
+          <p:style>
+            <a:lnRef idx="1">
+              <a:schemeClr val="accent1"/>
+            </a:lnRef>
+            <a:fillRef idx="3">
+              <a:schemeClr val="accent1"/>
+            </a:fillRef>
+            <a:effectRef idx="2">
+              <a:schemeClr val="accent1"/>
+            </a:effectRef>
+            <a:fontRef idx="minor">
+              <a:schemeClr val="lt1"/>
+            </a:fontRef>
+          </p:style>
+          <p:txBody>
+            <a:bodyPr rtlCol="0" anchor="ctr"/>
+            <a:lstStyle/>
+            <a:p>
+              <a:pPr algn="ctr"/>
+              <a:endParaRPr lang="en-US"/>
+            </a:p>
+          </p:txBody>
+        </p:sp>
+        <p:sp>
+          <p:nvSpPr>
+            <p:cNvPr id="15" name="Rectangle 14"/>
+            <p:cNvSpPr/>
+            <p:nvPr/>
+          </p:nvSpPr>
+          <p:spPr>
+            <a:xfrm>
+              <a:off x="2476500" y="1485900"/>
+              <a:ext cx="165100" cy="190500"/>
+            </a:xfrm>
+            <a:prstGeom prst="rect">
+              <a:avLst/>
+            </a:prstGeom>
+            <a:solidFill>
+              <a:srgbClr val="FFFF00"/>
+            </a:solidFill>
+            <a:ln>
+              <a:solidFill>
+                <a:srgbClr val="FFFF00"/>
+              </a:solidFill>
+            </a:ln>
+          </p:spPr>
+          <p:style>
+            <a:lnRef idx="1">
+              <a:schemeClr val="accent1"/>
+            </a:lnRef>
+            <a:fillRef idx="3">
+              <a:schemeClr val="accent1"/>
+            </a:fillRef>
+            <a:effectRef idx="2">
+              <a:schemeClr val="accent1"/>
+            </a:effectRef>
+            <a:fontRef idx="minor">
+              <a:schemeClr val="lt1"/>
+            </a:fontRef>
+          </p:style>
+          <p:txBody>
+            <a:bodyPr rtlCol="0" anchor="ctr"/>
+            <a:lstStyle/>
+            <a:p>
+              <a:pPr algn="ctr"/>
+              <a:endParaRPr lang="en-US"/>
+            </a:p>
+          </p:txBody>
+        </p:sp>
+        <p:sp>
+          <p:nvSpPr>
+            <p:cNvPr id="16" name="Rectangle 15"/>
+            <p:cNvSpPr/>
+            <p:nvPr/>
+          </p:nvSpPr>
+          <p:spPr>
+            <a:xfrm>
+              <a:off x="2933700" y="1485900"/>
+              <a:ext cx="165100" cy="190500"/>
+            </a:xfrm>
+            <a:prstGeom prst="rect">
+              <a:avLst/>
+            </a:prstGeom>
+            <a:solidFill>
+              <a:srgbClr val="FFFF00"/>
+            </a:solidFill>
+            <a:ln>
+              <a:solidFill>
+                <a:srgbClr val="FFFF00"/>
+              </a:solidFill>
+            </a:ln>
+          </p:spPr>
+          <p:style>
+            <a:lnRef idx="1">
+              <a:schemeClr val="accent1"/>
+            </a:lnRef>
+            <a:fillRef idx="3">
+              <a:schemeClr val="accent1"/>
+            </a:fillRef>
+            <a:effectRef idx="2">
+              <a:schemeClr val="accent1"/>
+            </a:effectRef>
+            <a:fontRef idx="minor">
+              <a:schemeClr val="lt1"/>
+            </a:fontRef>
+          </p:style>
+          <p:txBody>
+            <a:bodyPr rtlCol="0" anchor="ctr"/>
+            <a:lstStyle/>
+            <a:p>
+              <a:pPr algn="ctr"/>
+              <a:endParaRPr lang="en-US"/>
+            </a:p>
+          </p:txBody>
+        </p:sp>
+        <p:sp>
+          <p:nvSpPr>
+            <p:cNvPr id="17" name="Rectangle 16"/>
+            <p:cNvSpPr/>
+            <p:nvPr/>
+          </p:nvSpPr>
+          <p:spPr>
+            <a:xfrm>
+              <a:off x="2476500" y="2084311"/>
+              <a:ext cx="165100" cy="190500"/>
+            </a:xfrm>
+            <a:prstGeom prst="rect">
+              <a:avLst/>
+            </a:prstGeom>
+            <a:solidFill>
+              <a:srgbClr val="FFFF00"/>
+            </a:solidFill>
+            <a:ln>
+              <a:solidFill>
+                <a:srgbClr val="FFFF00"/>
+              </a:solidFill>
+            </a:ln>
+          </p:spPr>
+          <p:style>
+            <a:lnRef idx="1">
+              <a:schemeClr val="accent1"/>
+            </a:lnRef>
+            <a:fillRef idx="3">
+              <a:schemeClr val="accent1"/>
+            </a:fillRef>
+            <a:effectRef idx="2">
+              <a:schemeClr val="accent1"/>
+            </a:effectRef>
+            <a:fontRef idx="minor">
+              <a:schemeClr val="lt1"/>
+            </a:fontRef>
+          </p:style>
+          <p:txBody>
+            <a:bodyPr rtlCol="0" anchor="ctr"/>
+            <a:lstStyle/>
+            <a:p>
+              <a:pPr algn="ctr"/>
+              <a:endParaRPr lang="en-US"/>
+            </a:p>
+          </p:txBody>
+        </p:sp>
+        <p:sp>
+          <p:nvSpPr>
+            <p:cNvPr id="18" name="Rectangle 17"/>
+            <p:cNvSpPr/>
+            <p:nvPr/>
+          </p:nvSpPr>
+          <p:spPr>
+            <a:xfrm>
+              <a:off x="2933700" y="2084311"/>
+              <a:ext cx="165100" cy="190500"/>
+            </a:xfrm>
+            <a:prstGeom prst="rect">
+              <a:avLst/>
+            </a:prstGeom>
+            <a:solidFill>
+              <a:srgbClr val="FFFF00"/>
+            </a:solidFill>
+            <a:ln>
+              <a:solidFill>
+                <a:srgbClr val="FFFF00"/>
+              </a:solidFill>
+            </a:ln>
+          </p:spPr>
+          <p:style>
+            <a:lnRef idx="1">
+              <a:schemeClr val="accent1"/>
+            </a:lnRef>
+            <a:fillRef idx="3">
+              <a:schemeClr val="accent1"/>
+            </a:fillRef>
+            <a:effectRef idx="2">
+              <a:schemeClr val="accent1"/>
+            </a:effectRef>
+            <a:fontRef idx="minor">
+              <a:schemeClr val="lt1"/>
+            </a:fontRef>
+          </p:style>
+          <p:txBody>
+            <a:bodyPr rtlCol="0" anchor="ctr"/>
+            <a:lstStyle/>
+            <a:p>
+              <a:pPr algn="ctr"/>
+              <a:endParaRPr lang="en-US"/>
+            </a:p>
+          </p:txBody>
+        </p:sp>
+        <p:sp>
+          <p:nvSpPr>
+            <p:cNvPr id="19" name="Rectangle 18"/>
+            <p:cNvSpPr/>
+            <p:nvPr/>
+          </p:nvSpPr>
+          <p:spPr>
+            <a:xfrm>
+              <a:off x="2476500" y="2617711"/>
+              <a:ext cx="165100" cy="190500"/>
+            </a:xfrm>
+            <a:prstGeom prst="rect">
+              <a:avLst/>
+            </a:prstGeom>
+            <a:solidFill>
+              <a:srgbClr val="FFFF00"/>
+            </a:solidFill>
+            <a:ln>
+              <a:solidFill>
+                <a:srgbClr val="FFFF00"/>
+              </a:solidFill>
+            </a:ln>
+          </p:spPr>
+          <p:style>
+            <a:lnRef idx="1">
+              <a:schemeClr val="accent1"/>
+            </a:lnRef>
+            <a:fillRef idx="3">
+              <a:schemeClr val="accent1"/>
+            </a:fillRef>
+            <a:effectRef idx="2">
+              <a:schemeClr val="accent1"/>
+            </a:effectRef>
+            <a:fontRef idx="minor">
+              <a:schemeClr val="lt1"/>
+            </a:fontRef>
+          </p:style>
+          <p:txBody>
+            <a:bodyPr rtlCol="0" anchor="ctr"/>
+            <a:lstStyle/>
+            <a:p>
+              <a:pPr algn="ctr"/>
+              <a:endParaRPr lang="en-US"/>
+            </a:p>
+          </p:txBody>
+        </p:sp>
+        <p:sp>
+          <p:nvSpPr>
+            <p:cNvPr id="20" name="Rectangle 19"/>
+            <p:cNvSpPr/>
+            <p:nvPr/>
+          </p:nvSpPr>
+          <p:spPr>
+            <a:xfrm>
+              <a:off x="2933700" y="2617711"/>
+              <a:ext cx="165100" cy="190500"/>
+            </a:xfrm>
+            <a:prstGeom prst="rect">
+              <a:avLst/>
+            </a:prstGeom>
+            <a:solidFill>
+              <a:srgbClr val="FFFF00"/>
+            </a:solidFill>
+            <a:ln>
+              <a:solidFill>
+                <a:srgbClr val="FFFF00"/>
+              </a:solidFill>
+            </a:ln>
+          </p:spPr>
+          <p:style>
+            <a:lnRef idx="1">
+              <a:schemeClr val="accent1"/>
+            </a:lnRef>
+            <a:fillRef idx="3">
+              <a:schemeClr val="accent1"/>
+            </a:fillRef>
+            <a:effectRef idx="2">
+              <a:schemeClr val="accent1"/>
+            </a:effectRef>
+            <a:fontRef idx="minor">
+              <a:schemeClr val="lt1"/>
+            </a:fontRef>
+          </p:style>
+          <p:txBody>
+            <a:bodyPr rtlCol="0" anchor="ctr"/>
+            <a:lstStyle/>
+            <a:p>
+              <a:pPr algn="ctr"/>
+              <a:endParaRPr lang="en-US"/>
+            </a:p>
+          </p:txBody>
+        </p:sp>
+      </p:grpSp>
+      <p:sp>
+        <p:nvSpPr>
+          <p:cNvPr id="22" name="Oval 21"/>
+          <p:cNvSpPr/>
+          <p:nvPr/>
+        </p:nvSpPr>
+        <p:spPr>
+          <a:xfrm>
+            <a:off x="1765300" y="2819400"/>
+            <a:ext cx="1211886" cy="2413000"/>
+          </a:xfrm>
+          <a:prstGeom prst="ellipse">
+            <a:avLst/>
+          </a:prstGeom>
+          <a:noFill/>
+          <a:ln>
+            <a:solidFill>
+              <a:srgbClr val="FFFF00"/>
+            </a:solidFill>
+            <a:prstDash val="sysDash"/>
+          </a:ln>
+        </p:spPr>
+        <p:style>
+          <a:lnRef idx="1">
+            <a:schemeClr val="accent1"/>
+          </a:lnRef>
+          <a:fillRef idx="3">
+            <a:schemeClr val="accent1"/>
+          </a:fillRef>
+          <a:effectRef idx="2">
+            <a:schemeClr val="accent1"/>
+          </a:effectRef>
+          <a:fontRef idx="minor">
+            <a:schemeClr val="lt1"/>
+          </a:fontRef>
+        </p:style>
+        <p:txBody>
+          <a:bodyPr rtlCol="0" anchor="ctr"/>
+          <a:lstStyle/>
+          <a:p>
+            <a:pPr algn="ctr"/>
+            <a:endParaRPr lang="en-US"/>
+          </a:p>
+        </p:txBody>
+      </p:sp>
+      <p:sp>
+        <p:nvSpPr>
+          <p:cNvPr id="32" name="TextBox 31"/>
+          <p:cNvSpPr txBox="1"/>
+          <p:nvPr/>
+        </p:nvSpPr>
+        <p:spPr>
+          <a:xfrm>
+            <a:off x="5015660" y="5916711"/>
+            <a:ext cx="1619203" cy="307777"/>
+          </a:xfrm>
+          <a:prstGeom prst="rect">
+            <a:avLst/>
+          </a:prstGeom>
+          <a:solidFill>
+            <a:schemeClr val="bg1"/>
+          </a:solidFill>
+        </p:spPr>
+        <p:txBody>
+          <a:bodyPr wrap="none" rtlCol="0">
+            <a:spAutoFit/>
+          </a:bodyPr>
+          <a:lstStyle/>
+          <a:p>
+            <a:r>
+              <a:rPr lang="en-US" sz="1400" dirty="0" smtClean="0"/>
+              <a:t>Optimal Acquisition</a:t>
+            </a:r>
+            <a:endParaRPr lang="en-US" sz="1400" dirty="0"/>
+          </a:p>
+        </p:txBody>
+      </p:sp>
+      <p:sp>
+        <p:nvSpPr>
+          <p:cNvPr id="34" name="Cross 33"/>
+          <p:cNvSpPr/>
+          <p:nvPr/>
+        </p:nvSpPr>
+        <p:spPr>
+          <a:xfrm flipH="1" flipV="1">
+            <a:off x="5260138" y="3200400"/>
+            <a:ext cx="138357" cy="165100"/>
+          </a:xfrm>
+          <a:prstGeom prst="plus">
+            <a:avLst/>
+          </a:prstGeom>
+          <a:pattFill prst="solidDmnd">
+            <a:fgClr>
+              <a:schemeClr val="accent2">
+                <a:lumMod val="20000"/>
+                <a:lumOff val="80000"/>
+              </a:schemeClr>
+            </a:fgClr>
+            <a:bgClr>
+              <a:srgbClr val="FF6600"/>
+            </a:bgClr>
+          </a:pattFill>
+        </p:spPr>
+        <p:style>
+          <a:lnRef idx="1">
+            <a:schemeClr val="accent1"/>
+          </a:lnRef>
+          <a:fillRef idx="3">
+            <a:schemeClr val="accent1"/>
+          </a:fillRef>
+          <a:effectRef idx="2">
+            <a:schemeClr val="accent1"/>
+          </a:effectRef>
+          <a:fontRef idx="minor">
+            <a:schemeClr val="lt1"/>
+          </a:fontRef>
+        </p:style>
+        <p:txBody>
+          <a:bodyPr rtlCol="0" anchor="ctr"/>
+          <a:lstStyle/>
+          <a:p>
+            <a:pPr algn="ctr"/>
+            <a:endParaRPr lang="en-US"/>
+          </a:p>
+        </p:txBody>
+      </p:sp>
+      <p:sp>
+        <p:nvSpPr>
+          <p:cNvPr id="35" name="Cross 34"/>
+          <p:cNvSpPr/>
+          <p:nvPr/>
+        </p:nvSpPr>
+        <p:spPr>
+          <a:xfrm flipH="1" flipV="1">
+            <a:off x="4206038" y="2819400"/>
+            <a:ext cx="138357" cy="165100"/>
+          </a:xfrm>
+          <a:prstGeom prst="plus">
+            <a:avLst/>
+          </a:prstGeom>
+          <a:pattFill prst="solidDmnd">
+            <a:fgClr>
+              <a:schemeClr val="accent2">
+                <a:lumMod val="20000"/>
+                <a:lumOff val="80000"/>
+              </a:schemeClr>
+            </a:fgClr>
+            <a:bgClr>
+              <a:srgbClr val="FF6600"/>
+            </a:bgClr>
+          </a:pattFill>
+        </p:spPr>
+        <p:style>
+          <a:lnRef idx="1">
+            <a:schemeClr val="accent1"/>
+          </a:lnRef>
+          <a:fillRef idx="3">
+            <a:schemeClr val="accent1"/>
+          </a:fillRef>
+          <a:effectRef idx="2">
+            <a:schemeClr val="accent1"/>
+          </a:effectRef>
+          <a:fontRef idx="minor">
+            <a:schemeClr val="lt1"/>
+          </a:fontRef>
+        </p:style>
+        <p:txBody>
+          <a:bodyPr rtlCol="0" anchor="ctr"/>
+          <a:lstStyle/>
+          <a:p>
+            <a:pPr algn="ctr"/>
+            <a:endParaRPr lang="en-US"/>
+          </a:p>
+        </p:txBody>
+      </p:sp>
+      <p:sp>
+        <p:nvSpPr>
+          <p:cNvPr id="36" name="Cross 35"/>
+          <p:cNvSpPr/>
+          <p:nvPr/>
+        </p:nvSpPr>
+        <p:spPr>
+          <a:xfrm flipH="1" flipV="1">
+            <a:off x="4739438" y="3848100"/>
+            <a:ext cx="138357" cy="165100"/>
+          </a:xfrm>
+          <a:prstGeom prst="plus">
+            <a:avLst/>
+          </a:prstGeom>
+          <a:pattFill prst="solidDmnd">
+            <a:fgClr>
+              <a:schemeClr val="accent2">
+                <a:lumMod val="20000"/>
+                <a:lumOff val="80000"/>
+              </a:schemeClr>
+            </a:fgClr>
+            <a:bgClr>
+              <a:srgbClr val="FF6600"/>
+            </a:bgClr>
+          </a:pattFill>
+        </p:spPr>
+        <p:style>
+          <a:lnRef idx="1">
+            <a:schemeClr val="accent1"/>
+          </a:lnRef>
+          <a:fillRef idx="3">
+            <a:schemeClr val="accent1"/>
+          </a:fillRef>
+          <a:effectRef idx="2">
+            <a:schemeClr val="accent1"/>
+          </a:effectRef>
+          <a:fontRef idx="minor">
+            <a:schemeClr val="lt1"/>
+          </a:fontRef>
+        </p:style>
+        <p:txBody>
+          <a:bodyPr rtlCol="0" anchor="ctr"/>
+          <a:lstStyle/>
+          <a:p>
+            <a:pPr algn="ctr"/>
+            <a:endParaRPr lang="en-US"/>
+          </a:p>
+        </p:txBody>
+      </p:sp>
+      <p:sp>
+        <p:nvSpPr>
+          <p:cNvPr id="37" name="Cross 36"/>
+          <p:cNvSpPr/>
+          <p:nvPr/>
+        </p:nvSpPr>
+        <p:spPr>
+          <a:xfrm flipH="1" flipV="1">
+            <a:off x="6352338" y="4332211"/>
+            <a:ext cx="138357" cy="165100"/>
+          </a:xfrm>
+          <a:prstGeom prst="plus">
+            <a:avLst/>
+          </a:prstGeom>
+          <a:pattFill prst="solidDmnd">
+            <a:fgClr>
+              <a:schemeClr val="accent2">
+                <a:lumMod val="20000"/>
+                <a:lumOff val="80000"/>
+              </a:schemeClr>
+            </a:fgClr>
+            <a:bgClr>
+              <a:srgbClr val="FF6600"/>
+            </a:bgClr>
+          </a:pattFill>
+        </p:spPr>
+        <p:style>
+          <a:lnRef idx="1">
+            <a:schemeClr val="accent1"/>
+          </a:lnRef>
+          <a:fillRef idx="3">
+            <a:schemeClr val="accent1"/>
+          </a:fillRef>
+          <a:effectRef idx="2">
+            <a:schemeClr val="accent1"/>
+          </a:effectRef>
+          <a:fontRef idx="minor">
+            <a:schemeClr val="lt1"/>
+          </a:fontRef>
+        </p:style>
+        <p:txBody>
+          <a:bodyPr rtlCol="0" anchor="ctr"/>
+          <a:lstStyle/>
+          <a:p>
+            <a:pPr algn="ctr"/>
+            <a:endParaRPr lang="en-US"/>
+          </a:p>
+        </p:txBody>
+      </p:sp>
+      <p:sp>
+        <p:nvSpPr>
+          <p:cNvPr id="38" name="Cross 37"/>
+          <p:cNvSpPr/>
+          <p:nvPr/>
+        </p:nvSpPr>
+        <p:spPr>
+          <a:xfrm flipH="1" flipV="1">
+            <a:off x="5160876" y="5564111"/>
+            <a:ext cx="138357" cy="165100"/>
+          </a:xfrm>
+          <a:prstGeom prst="plus">
+            <a:avLst/>
+          </a:prstGeom>
+          <a:pattFill prst="solidDmnd">
+            <a:fgClr>
+              <a:schemeClr val="accent2">
+                <a:lumMod val="20000"/>
+                <a:lumOff val="80000"/>
+              </a:schemeClr>
+            </a:fgClr>
+            <a:bgClr>
+              <a:srgbClr val="FF6600"/>
+            </a:bgClr>
+          </a:pattFill>
+        </p:spPr>
+        <p:style>
+          <a:lnRef idx="1">
+            <a:schemeClr val="accent1"/>
+          </a:lnRef>
+          <a:fillRef idx="3">
+            <a:schemeClr val="accent1"/>
+          </a:fillRef>
+          <a:effectRef idx="2">
+            <a:schemeClr val="accent1"/>
+          </a:effectRef>
+          <a:fontRef idx="minor">
+            <a:schemeClr val="lt1"/>
+          </a:fontRef>
+        </p:style>
+        <p:txBody>
+          <a:bodyPr rtlCol="0" anchor="ctr"/>
+          <a:lstStyle/>
+          <a:p>
+            <a:pPr algn="ctr"/>
+            <a:endParaRPr lang="en-US"/>
+          </a:p>
+        </p:txBody>
+      </p:sp>
+      <p:sp>
+        <p:nvSpPr>
+          <p:cNvPr id="39" name="Cross 38"/>
+          <p:cNvSpPr/>
+          <p:nvPr/>
+        </p:nvSpPr>
+        <p:spPr>
+          <a:xfrm flipH="1" flipV="1">
+            <a:off x="4206038" y="5489422"/>
+            <a:ext cx="138357" cy="165100"/>
+          </a:xfrm>
+          <a:prstGeom prst="plus">
+            <a:avLst/>
+          </a:prstGeom>
+          <a:pattFill prst="solidDmnd">
+            <a:fgClr>
+              <a:schemeClr val="accent2">
+                <a:lumMod val="20000"/>
+                <a:lumOff val="80000"/>
+              </a:schemeClr>
+            </a:fgClr>
+            <a:bgClr>
+              <a:srgbClr val="FF6600"/>
+            </a:bgClr>
+          </a:pattFill>
+        </p:spPr>
+        <p:style>
+          <a:lnRef idx="1">
+            <a:schemeClr val="accent1"/>
+          </a:lnRef>
+          <a:fillRef idx="3">
+            <a:schemeClr val="accent1"/>
+          </a:fillRef>
+          <a:effectRef idx="2">
+            <a:schemeClr val="accent1"/>
+          </a:effectRef>
+          <a:fontRef idx="minor">
+            <a:schemeClr val="lt1"/>
+          </a:fontRef>
+        </p:style>
+        <p:txBody>
+          <a:bodyPr rtlCol="0" anchor="ctr"/>
+          <a:lstStyle/>
+          <a:p>
+            <a:pPr algn="ctr"/>
+            <a:endParaRPr lang="en-US"/>
+          </a:p>
+        </p:txBody>
+      </p:sp>
+      <p:sp>
+        <p:nvSpPr>
+          <p:cNvPr id="40" name="Cross 39"/>
+          <p:cNvSpPr/>
+          <p:nvPr/>
+        </p:nvSpPr>
+        <p:spPr>
+          <a:xfrm flipH="1" flipV="1">
+            <a:off x="3532938" y="4879822"/>
+            <a:ext cx="138357" cy="165100"/>
+          </a:xfrm>
+          <a:prstGeom prst="plus">
+            <a:avLst/>
+          </a:prstGeom>
+          <a:pattFill prst="solidDmnd">
+            <a:fgClr>
+              <a:schemeClr val="accent2">
+                <a:lumMod val="20000"/>
+                <a:lumOff val="80000"/>
+              </a:schemeClr>
+            </a:fgClr>
+            <a:bgClr>
+              <a:srgbClr val="FF6600"/>
+            </a:bgClr>
+          </a:pattFill>
+        </p:spPr>
+        <p:style>
+          <a:lnRef idx="1">
+            <a:schemeClr val="accent1"/>
+          </a:lnRef>
+          <a:fillRef idx="3">
+            <a:schemeClr val="accent1"/>
+          </a:fillRef>
+          <a:effectRef idx="2">
+            <a:schemeClr val="accent1"/>
+          </a:effectRef>
+          <a:fontRef idx="minor">
+            <a:schemeClr val="lt1"/>
+          </a:fontRef>
+        </p:style>
+        <p:txBody>
+          <a:bodyPr rtlCol="0" anchor="ctr"/>
+          <a:lstStyle/>
+          <a:p>
+            <a:pPr algn="ctr"/>
+            <a:endParaRPr lang="en-US"/>
+          </a:p>
+        </p:txBody>
+      </p:sp>
+      <p:sp>
+        <p:nvSpPr>
+          <p:cNvPr id="41" name="Cross 40"/>
+          <p:cNvSpPr/>
+          <p:nvPr/>
+        </p:nvSpPr>
+        <p:spPr>
+          <a:xfrm flipH="1" flipV="1">
+            <a:off x="2977186" y="4059161"/>
+            <a:ext cx="138357" cy="165100"/>
+          </a:xfrm>
+          <a:prstGeom prst="plus">
+            <a:avLst/>
+          </a:prstGeom>
+          <a:pattFill prst="solidDmnd">
+            <a:fgClr>
+              <a:schemeClr val="accent2">
+                <a:lumMod val="20000"/>
+                <a:lumOff val="80000"/>
+              </a:schemeClr>
+            </a:fgClr>
+            <a:bgClr>
+              <a:srgbClr val="FF6600"/>
+            </a:bgClr>
+          </a:pattFill>
+        </p:spPr>
+        <p:style>
+          <a:lnRef idx="1">
+            <a:schemeClr val="accent1"/>
+          </a:lnRef>
+          <a:fillRef idx="3">
+            <a:schemeClr val="accent1"/>
+          </a:fillRef>
+          <a:effectRef idx="2">
+            <a:schemeClr val="accent1"/>
+          </a:effectRef>
+          <a:fontRef idx="minor">
+            <a:schemeClr val="lt1"/>
+          </a:fontRef>
+        </p:style>
+        <p:txBody>
+          <a:bodyPr rtlCol="0" anchor="ctr"/>
+          <a:lstStyle/>
+          <a:p>
+            <a:pPr algn="ctr"/>
+            <a:endParaRPr lang="en-US"/>
+          </a:p>
+        </p:txBody>
+      </p:sp>
+      <p:cxnSp>
+        <p:nvCxnSpPr>
+          <p:cNvPr id="43" name="Straight Arrow Connector 42"/>
+          <p:cNvCxnSpPr/>
+          <p:nvPr/>
+        </p:nvCxnSpPr>
+        <p:spPr>
+          <a:xfrm flipH="1" flipV="1">
+            <a:off x="4842033" y="4001988"/>
+            <a:ext cx="914400" cy="1914723"/>
+          </a:xfrm>
+          <a:prstGeom prst="straightConnector1">
+            <a:avLst/>
+          </a:prstGeom>
+          <a:ln>
+            <a:solidFill>
+              <a:srgbClr val="FF0000"/>
+            </a:solidFill>
+            <a:tailEnd type="arrow"/>
+          </a:ln>
+        </p:spPr>
+        <p:style>
+          <a:lnRef idx="2">
+            <a:schemeClr val="accent1"/>
+          </a:lnRef>
+          <a:fillRef idx="0">
+            <a:schemeClr val="accent1"/>
+          </a:fillRef>
+          <a:effectRef idx="1">
+            <a:schemeClr val="accent1"/>
+          </a:effectRef>
+          <a:fontRef idx="minor">
+            <a:schemeClr val="tx1"/>
+          </a:fontRef>
+        </p:style>
+      </p:cxnSp>
+      <p:cxnSp>
+        <p:nvCxnSpPr>
+          <p:cNvPr id="45" name="Straight Arrow Connector 44"/>
+          <p:cNvCxnSpPr/>
+          <p:nvPr/>
+        </p:nvCxnSpPr>
+        <p:spPr>
+          <a:xfrm flipH="1" flipV="1">
+            <a:off x="3575714" y="5021034"/>
+            <a:ext cx="1585162" cy="1049566"/>
+          </a:xfrm>
+          <a:prstGeom prst="straightConnector1">
+            <a:avLst/>
+          </a:prstGeom>
+          <a:ln>
+            <a:solidFill>
+              <a:srgbClr val="FF0000"/>
+            </a:solidFill>
+            <a:tailEnd type="arrow"/>
+          </a:ln>
+        </p:spPr>
+        <p:style>
+          <a:lnRef idx="2">
+            <a:schemeClr val="accent1"/>
+          </a:lnRef>
+          <a:fillRef idx="0">
+            <a:schemeClr val="accent1"/>
+          </a:fillRef>
+          <a:effectRef idx="1">
+            <a:schemeClr val="accent1"/>
+          </a:effectRef>
+          <a:fontRef idx="minor">
+            <a:schemeClr val="tx1"/>
+          </a:fontRef>
+        </p:style>
+      </p:cxnSp>
+      <p:cxnSp>
+        <p:nvCxnSpPr>
+          <p:cNvPr id="47" name="Straight Arrow Connector 46"/>
+          <p:cNvCxnSpPr/>
+          <p:nvPr/>
+        </p:nvCxnSpPr>
+        <p:spPr>
+          <a:xfrm flipH="1" flipV="1">
+            <a:off x="4344396" y="5654522"/>
+            <a:ext cx="671264" cy="416078"/>
+          </a:xfrm>
+          <a:prstGeom prst="straightConnector1">
+            <a:avLst/>
+          </a:prstGeom>
+          <a:ln>
+            <a:solidFill>
+              <a:srgbClr val="FF0000"/>
+            </a:solidFill>
+            <a:tailEnd type="arrow"/>
+          </a:ln>
+        </p:spPr>
+        <p:style>
+          <a:lnRef idx="2">
+            <a:schemeClr val="accent1"/>
+          </a:lnRef>
+          <a:fillRef idx="0">
+            <a:schemeClr val="accent1"/>
+          </a:fillRef>
+          <a:effectRef idx="1">
+            <a:schemeClr val="accent1"/>
+          </a:effectRef>
+          <a:fontRef idx="minor">
+            <a:schemeClr val="tx1"/>
+          </a:fontRef>
+        </p:style>
+      </p:cxnSp>
+      <p:cxnSp>
+        <p:nvCxnSpPr>
+          <p:cNvPr id="50" name="Straight Arrow Connector 49"/>
+          <p:cNvCxnSpPr/>
+          <p:nvPr/>
+        </p:nvCxnSpPr>
+        <p:spPr>
+          <a:xfrm flipH="1" flipV="1">
+            <a:off x="5260138" y="5708672"/>
+            <a:ext cx="192900" cy="208039"/>
+          </a:xfrm>
+          <a:prstGeom prst="straightConnector1">
+            <a:avLst/>
+          </a:prstGeom>
+          <a:ln>
+            <a:solidFill>
+              <a:srgbClr val="FF0000"/>
+            </a:solidFill>
+            <a:tailEnd type="arrow"/>
+          </a:ln>
+        </p:spPr>
+        <p:style>
+          <a:lnRef idx="2">
+            <a:schemeClr val="accent1"/>
+          </a:lnRef>
+          <a:fillRef idx="0">
+            <a:schemeClr val="accent1"/>
+          </a:fillRef>
+          <a:effectRef idx="1">
+            <a:schemeClr val="accent1"/>
+          </a:effectRef>
+          <a:fontRef idx="minor">
+            <a:schemeClr val="tx1"/>
+          </a:fontRef>
+        </p:style>
+      </p:cxnSp>
+      <p:cxnSp>
+        <p:nvCxnSpPr>
+          <p:cNvPr id="52" name="Straight Arrow Connector 51"/>
+          <p:cNvCxnSpPr/>
+          <p:nvPr/>
+        </p:nvCxnSpPr>
+        <p:spPr>
+          <a:xfrm flipV="1">
+            <a:off x="6223000" y="4497312"/>
+            <a:ext cx="267695" cy="1419399"/>
+          </a:xfrm>
+          <a:prstGeom prst="straightConnector1">
+            <a:avLst/>
+          </a:prstGeom>
+          <a:ln>
+            <a:solidFill>
+              <a:srgbClr val="FF0000"/>
+            </a:solidFill>
+            <a:tailEnd type="arrow"/>
+          </a:ln>
+        </p:spPr>
+        <p:style>
+          <a:lnRef idx="2">
+            <a:schemeClr val="accent1"/>
+          </a:lnRef>
+          <a:fillRef idx="0">
+            <a:schemeClr val="accent1"/>
+          </a:fillRef>
+          <a:effectRef idx="1">
+            <a:schemeClr val="accent1"/>
+          </a:effectRef>
+          <a:fontRef idx="minor">
+            <a:schemeClr val="tx1"/>
+          </a:fontRef>
+        </p:style>
+      </p:cxnSp>
+      <p:cxnSp>
+        <p:nvCxnSpPr>
+          <p:cNvPr id="54" name="Straight Arrow Connector 53"/>
+          <p:cNvCxnSpPr>
+            <a:endCxn id="34" idx="0"/>
+          </p:cNvCxnSpPr>
+          <p:nvPr/>
+        </p:nvCxnSpPr>
+        <p:spPr>
+          <a:xfrm flipH="1" flipV="1">
+            <a:off x="5329316" y="3365500"/>
+            <a:ext cx="531734" cy="2576600"/>
+          </a:xfrm>
+          <a:prstGeom prst="straightConnector1">
+            <a:avLst/>
+          </a:prstGeom>
+          <a:ln>
+            <a:solidFill>
+              <a:srgbClr val="FF0000"/>
+            </a:solidFill>
+            <a:tailEnd type="arrow"/>
+          </a:ln>
+        </p:spPr>
+        <p:style>
+          <a:lnRef idx="2">
+            <a:schemeClr val="accent1"/>
+          </a:lnRef>
+          <a:fillRef idx="0">
+            <a:schemeClr val="accent1"/>
+          </a:fillRef>
+          <a:effectRef idx="1">
+            <a:schemeClr val="accent1"/>
+          </a:effectRef>
+          <a:fontRef idx="minor">
+            <a:schemeClr val="tx1"/>
+          </a:fontRef>
+        </p:style>
+      </p:cxnSp>
+      <p:cxnSp>
+        <p:nvCxnSpPr>
+          <p:cNvPr id="56" name="Straight Arrow Connector 55"/>
+          <p:cNvCxnSpPr/>
+          <p:nvPr/>
+        </p:nvCxnSpPr>
+        <p:spPr>
+          <a:xfrm flipH="1" flipV="1">
+            <a:off x="4310299" y="2984500"/>
+            <a:ext cx="949839" cy="2957600"/>
+          </a:xfrm>
+          <a:prstGeom prst="straightConnector1">
+            <a:avLst/>
+          </a:prstGeom>
+          <a:ln>
+            <a:solidFill>
+              <a:srgbClr val="FF0000"/>
+            </a:solidFill>
+            <a:tailEnd type="arrow"/>
+          </a:ln>
+        </p:spPr>
+        <p:style>
+          <a:lnRef idx="2">
+            <a:schemeClr val="accent1"/>
+          </a:lnRef>
+          <a:fillRef idx="0">
+            <a:schemeClr val="accent1"/>
+          </a:fillRef>
+          <a:effectRef idx="1">
+            <a:schemeClr val="accent1"/>
+          </a:effectRef>
+          <a:fontRef idx="minor">
+            <a:schemeClr val="tx1"/>
+          </a:fontRef>
+        </p:style>
+      </p:cxnSp>
+      <p:cxnSp>
+        <p:nvCxnSpPr>
+          <p:cNvPr id="58" name="Straight Arrow Connector 57"/>
+          <p:cNvCxnSpPr/>
+          <p:nvPr/>
+        </p:nvCxnSpPr>
+        <p:spPr>
+          <a:xfrm flipH="1" flipV="1">
+            <a:off x="3115544" y="4175722"/>
+            <a:ext cx="2045332" cy="1766378"/>
+          </a:xfrm>
+          <a:prstGeom prst="straightConnector1">
+            <a:avLst/>
+          </a:prstGeom>
+          <a:ln>
+            <a:solidFill>
+              <a:srgbClr val="FF0000"/>
+            </a:solidFill>
+            <a:tailEnd type="arrow"/>
+          </a:ln>
+        </p:spPr>
+        <p:style>
+          <a:lnRef idx="2">
+            <a:schemeClr val="accent1"/>
+          </a:lnRef>
+          <a:fillRef idx="0">
+            <a:schemeClr val="accent1"/>
+          </a:fillRef>
+          <a:effectRef idx="1">
+            <a:schemeClr val="accent1"/>
+          </a:effectRef>
+          <a:fontRef idx="minor">
+            <a:schemeClr val="tx1"/>
+          </a:fontRef>
+        </p:style>
+      </p:cxnSp>
+      <p:sp>
+        <p:nvSpPr>
+          <p:cNvPr id="60" name="TextBox 59"/>
+          <p:cNvSpPr txBox="1"/>
+          <p:nvPr/>
+        </p:nvSpPr>
+        <p:spPr>
+          <a:xfrm>
+            <a:off x="1831998" y="2392088"/>
+            <a:ext cx="1594394" cy="307777"/>
+          </a:xfrm>
+          <a:prstGeom prst="rect">
+            <a:avLst/>
+          </a:prstGeom>
+          <a:solidFill>
+            <a:schemeClr val="bg1"/>
+          </a:solidFill>
+        </p:spPr>
+        <p:txBody>
+          <a:bodyPr wrap="none" rtlCol="0">
+            <a:spAutoFit/>
+          </a:bodyPr>
+          <a:lstStyle/>
+          <a:p>
+            <a:r>
+              <a:rPr lang="en-US" sz="1400" dirty="0" smtClean="0"/>
+              <a:t>Current Acquisition</a:t>
+            </a:r>
+            <a:endParaRPr lang="en-US" sz="1400" dirty="0"/>
+          </a:p>
+        </p:txBody>
+      </p:sp>
+    </p:spTree>
+    <p:extLst>
+      <p:ext uri="{BB962C8B-B14F-4D97-AF65-F5344CB8AC3E}">
+        <p14:creationId xmlns:p14="http://schemas.microsoft.com/office/powerpoint/2010/main" val="1182624476"/>
       </p:ext>
     </p:extLst>
   </p:cSld>

</xml_diff>